<commit_message>
zmeny v prezentaci (probably last commit ever :-)
</commit_message>
<xml_diff>
--- a/langer_prezentace.pptx
+++ b/langer_prezentace.pptx
@@ -204,7 +204,7 @@
           <a:p>
             <a:fld id="{414A737C-C1C8-47EE-8953-F85251D7A35B}" type="datetimeFigureOut">
               <a:rPr lang="cs-CZ" smtClean="0"/>
-              <a:t>27.1.2011</a:t>
+              <a:t>31.1.2011</a:t>
             </a:fld>
             <a:endParaRPr lang="cs-CZ"/>
           </a:p>
@@ -626,11 +626,7 @@
           <a:p>
             <a:r>
               <a:rPr lang="cs-CZ" dirty="0" smtClean="0"/>
-              <a:t>Druhým </a:t>
-            </a:r>
-            <a:r>
-              <a:rPr lang="cs-CZ" dirty="0" smtClean="0"/>
-              <a:t>krokem definice metody</a:t>
+              <a:t>Druhým krokem definice metody</a:t>
             </a:r>
             <a:r>
               <a:rPr lang="cs-CZ" baseline="0" dirty="0" smtClean="0"/>
@@ -2023,7 +2019,7 @@
           <a:p>
             <a:fld id="{35DFA50A-2056-47D5-8D27-FAAB0C5C28B4}" type="datetime1">
               <a:rPr lang="cs-CZ" smtClean="0"/>
-              <a:t>27.1.2011</a:t>
+              <a:t>31.1.2011</a:t>
             </a:fld>
             <a:endParaRPr lang="cs-CZ"/>
           </a:p>
@@ -2188,7 +2184,7 @@
           <a:p>
             <a:fld id="{90BBCDB1-CB61-43F5-B1BB-0FE88AAD6852}" type="datetime1">
               <a:rPr lang="cs-CZ" smtClean="0"/>
-              <a:t>27.1.2011</a:t>
+              <a:t>31.1.2011</a:t>
             </a:fld>
             <a:endParaRPr lang="cs-CZ"/>
           </a:p>
@@ -2363,7 +2359,7 @@
           <a:p>
             <a:fld id="{5745533E-1BCF-4B5D-B9D0-8FFDC9D44CE6}" type="datetime1">
               <a:rPr lang="cs-CZ" smtClean="0"/>
-              <a:t>27.1.2011</a:t>
+              <a:t>31.1.2011</a:t>
             </a:fld>
             <a:endParaRPr lang="cs-CZ"/>
           </a:p>
@@ -2528,7 +2524,7 @@
           <a:p>
             <a:fld id="{CB565F49-A976-4B42-A940-B6272E16695E}" type="datetime1">
               <a:rPr lang="cs-CZ" smtClean="0"/>
-              <a:t>27.1.2011</a:t>
+              <a:t>31.1.2011</a:t>
             </a:fld>
             <a:endParaRPr lang="cs-CZ"/>
           </a:p>
@@ -2769,7 +2765,7 @@
           <a:p>
             <a:fld id="{7514FB20-3611-40BE-A254-335501AEEFB8}" type="datetime1">
               <a:rPr lang="cs-CZ" smtClean="0"/>
-              <a:t>27.1.2011</a:t>
+              <a:t>31.1.2011</a:t>
             </a:fld>
             <a:endParaRPr lang="cs-CZ"/>
           </a:p>
@@ -3052,7 +3048,7 @@
           <a:p>
             <a:fld id="{B1407F05-D04E-4071-81FA-323B4FF7BD81}" type="datetime1">
               <a:rPr lang="cs-CZ" smtClean="0"/>
-              <a:t>27.1.2011</a:t>
+              <a:t>31.1.2011</a:t>
             </a:fld>
             <a:endParaRPr lang="cs-CZ"/>
           </a:p>
@@ -3481,7 +3477,7 @@
           <a:p>
             <a:fld id="{D340DEB3-4934-4A48-8AA5-B1B5F963A07E}" type="datetime1">
               <a:rPr lang="cs-CZ" smtClean="0"/>
-              <a:t>27.1.2011</a:t>
+              <a:t>31.1.2011</a:t>
             </a:fld>
             <a:endParaRPr lang="cs-CZ"/>
           </a:p>
@@ -3594,7 +3590,7 @@
           <a:p>
             <a:fld id="{8B170DDC-8F21-4748-8864-ACC3E39DB829}" type="datetime1">
               <a:rPr lang="cs-CZ" smtClean="0"/>
-              <a:t>27.1.2011</a:t>
+              <a:t>31.1.2011</a:t>
             </a:fld>
             <a:endParaRPr lang="cs-CZ"/>
           </a:p>
@@ -3684,7 +3680,7 @@
           <a:p>
             <a:fld id="{36DBA700-3CAE-4B8C-87EE-61D6268AE0AC}" type="datetime1">
               <a:rPr lang="cs-CZ" smtClean="0"/>
-              <a:t>27.1.2011</a:t>
+              <a:t>31.1.2011</a:t>
             </a:fld>
             <a:endParaRPr lang="cs-CZ"/>
           </a:p>
@@ -3873,7 +3869,7 @@
           <a:p>
             <a:fld id="{1224B2F6-540F-4476-B6D6-C714C5AA0FE2}" type="datetime1">
               <a:rPr lang="cs-CZ" smtClean="0"/>
-              <a:t>27.1.2011</a:t>
+              <a:t>31.1.2011</a:t>
             </a:fld>
             <a:endParaRPr lang="cs-CZ"/>
           </a:p>
@@ -4191,7 +4187,7 @@
           <a:p>
             <a:fld id="{D93E147C-E383-4237-8DED-C76241EE16DB}" type="datetime1">
               <a:rPr lang="cs-CZ" smtClean="0"/>
-              <a:t>27.1.2011</a:t>
+              <a:t>31.1.2011</a:t>
             </a:fld>
             <a:endParaRPr lang="cs-CZ"/>
           </a:p>
@@ -4570,7 +4566,7 @@
           <a:p>
             <a:fld id="{AA7F92AC-3FE4-4830-9C5A-BBAE8D4850D2}" type="datetime1">
               <a:rPr lang="cs-CZ" smtClean="0"/>
-              <a:t>27.1.2011</a:t>
+              <a:t>31.1.2011</a:t>
             </a:fld>
             <a:endParaRPr lang="cs-CZ"/>
           </a:p>
@@ -5288,7 +5284,7 @@
           <a:p>
             <a:r>
               <a:rPr lang="cs-CZ" dirty="0"/>
-              <a:t>Rozhraní aplikace</a:t>
+              <a:t>Komunikační rozhraní aplikace</a:t>
             </a:r>
           </a:p>
         </p:txBody>
@@ -5525,11 +5521,7 @@
           <a:p>
             <a:r>
               <a:rPr lang="cs-CZ" dirty="0" smtClean="0"/>
-              <a:t>Otestována </a:t>
-            </a:r>
-            <a:r>
-              <a:rPr lang="cs-CZ" dirty="0" smtClean="0"/>
-              <a:t>s testovacími klienty</a:t>
+              <a:t>Otestována s testovacími klienty</a:t>
             </a:r>
           </a:p>
           <a:p>
@@ -6373,7 +6365,7 @@
             <a:pPr lvl="1"/>
             <a:r>
               <a:rPr lang="cs-CZ" dirty="0" smtClean="0"/>
-              <a:t>Správa revizí a hlídání změn v datech</a:t>
+              <a:t>Správa revizí a sledování změn v datech</a:t>
             </a:r>
           </a:p>
           <a:p>

</xml_diff>